<commit_message>
Make card flip for onClick
</commit_message>
<xml_diff>
--- a/CS311 P2 Process Document.pptx
+++ b/CS311 P2 Process Document.pptx
@@ -126,7 +126,7 @@
 <file path=ppt/revisionInfo.xml><?xml version="1.0" encoding="utf-8"?>
 <p1510:revInfo xmlns:a="http://schemas.openxmlformats.org/drawingml/2006/main" xmlns:r="http://schemas.openxmlformats.org/officeDocument/2006/relationships" xmlns:p1510="http://schemas.microsoft.com/office/powerpoint/2015/10/main">
   <p1510:revLst>
-    <p1510:client id="{52C90AF6-B0D0-BA44-AC3D-6E376D800E03}" v="2" dt="2024-10-17T01:05:33.712"/>
+    <p1510:client id="{52C90AF6-B0D0-BA44-AC3D-6E376D800E03}" v="5" dt="2024-10-24T03:02:52.472"/>
   </p1510:revLst>
 </p1510:revInfo>
 </file>
@@ -136,22 +136,30 @@
   <pc:docChgLst>
     <pc:chgData name="Mercer, Emmaline" userId="9fb0acdb-0feb-4638-aad2-6b70626d8df4" providerId="ADAL" clId="{52C90AF6-B0D0-BA44-AC3D-6E376D800E03}"/>
     <pc:docChg chg="undo custSel modSld">
-      <pc:chgData name="Mercer, Emmaline" userId="9fb0acdb-0feb-4638-aad2-6b70626d8df4" providerId="ADAL" clId="{52C90AF6-B0D0-BA44-AC3D-6E376D800E03}" dt="2024-10-17T01:07:25.970" v="1310" actId="113"/>
+      <pc:chgData name="Mercer, Emmaline" userId="9fb0acdb-0feb-4638-aad2-6b70626d8df4" providerId="ADAL" clId="{52C90AF6-B0D0-BA44-AC3D-6E376D800E03}" dt="2024-10-25T15:29:14.915" v="2220"/>
       <pc:docMkLst>
         <pc:docMk/>
       </pc:docMkLst>
-      <pc:sldChg chg="modSp mod">
-        <pc:chgData name="Mercer, Emmaline" userId="9fb0acdb-0feb-4638-aad2-6b70626d8df4" providerId="ADAL" clId="{52C90AF6-B0D0-BA44-AC3D-6E376D800E03}" dt="2024-10-17T01:05:33.703" v="1222" actId="20577"/>
+      <pc:sldChg chg="addSp delSp modSp mod">
+        <pc:chgData name="Mercer, Emmaline" userId="9fb0acdb-0feb-4638-aad2-6b70626d8df4" providerId="ADAL" clId="{52C90AF6-B0D0-BA44-AC3D-6E376D800E03}" dt="2024-10-25T15:29:14.915" v="2220"/>
         <pc:sldMkLst>
           <pc:docMk/>
           <pc:sldMk cId="4052484121" sldId="256"/>
         </pc:sldMkLst>
         <pc:spChg chg="mod">
-          <ac:chgData name="Mercer, Emmaline" userId="9fb0acdb-0feb-4638-aad2-6b70626d8df4" providerId="ADAL" clId="{52C90AF6-B0D0-BA44-AC3D-6E376D800E03}" dt="2024-10-17T01:05:33.703" v="1222" actId="20577"/>
+          <ac:chgData name="Mercer, Emmaline" userId="9fb0acdb-0feb-4638-aad2-6b70626d8df4" providerId="ADAL" clId="{52C90AF6-B0D0-BA44-AC3D-6E376D800E03}" dt="2024-10-25T15:29:14.915" v="2220"/>
           <ac:spMkLst>
             <pc:docMk/>
             <pc:sldMk cId="4052484121" sldId="256"/>
             <ac:spMk id="3" creationId="{8C1841AA-124E-96F3-F306-F6DB32498455}"/>
+          </ac:spMkLst>
+        </pc:spChg>
+        <pc:spChg chg="add del mod">
+          <ac:chgData name="Mercer, Emmaline" userId="9fb0acdb-0feb-4638-aad2-6b70626d8df4" providerId="ADAL" clId="{52C90AF6-B0D0-BA44-AC3D-6E376D800E03}" dt="2024-10-24T03:03:32.503" v="2219"/>
+          <ac:spMkLst>
+            <pc:docMk/>
+            <pc:sldMk cId="4052484121" sldId="256"/>
+            <ac:spMk id="4" creationId="{1CA2D6C8-2BF8-570D-8A13-44E77FF7BD7D}"/>
           </ac:spMkLst>
         </pc:spChg>
       </pc:sldChg>
@@ -200,6 +208,51 @@
           </ac:spMkLst>
         </pc:spChg>
       </pc:sldChg>
+      <pc:sldChg chg="modSp mod">
+        <pc:chgData name="Mercer, Emmaline" userId="9fb0acdb-0feb-4638-aad2-6b70626d8df4" providerId="ADAL" clId="{52C90AF6-B0D0-BA44-AC3D-6E376D800E03}" dt="2024-10-24T02:58:30.322" v="1850" actId="20577"/>
+        <pc:sldMkLst>
+          <pc:docMk/>
+          <pc:sldMk cId="342121303" sldId="263"/>
+        </pc:sldMkLst>
+        <pc:spChg chg="mod">
+          <ac:chgData name="Mercer, Emmaline" userId="9fb0acdb-0feb-4638-aad2-6b70626d8df4" providerId="ADAL" clId="{52C90AF6-B0D0-BA44-AC3D-6E376D800E03}" dt="2024-10-24T02:58:30.322" v="1850" actId="20577"/>
+          <ac:spMkLst>
+            <pc:docMk/>
+            <pc:sldMk cId="342121303" sldId="263"/>
+            <ac:spMk id="3" creationId="{6DA9F2D2-7AB1-E1C6-27D2-DE6994C38626}"/>
+          </ac:spMkLst>
+        </pc:spChg>
+      </pc:sldChg>
+      <pc:sldChg chg="modSp mod">
+        <pc:chgData name="Mercer, Emmaline" userId="9fb0acdb-0feb-4638-aad2-6b70626d8df4" providerId="ADAL" clId="{52C90AF6-B0D0-BA44-AC3D-6E376D800E03}" dt="2024-10-24T03:00:06.850" v="2208" actId="20577"/>
+        <pc:sldMkLst>
+          <pc:docMk/>
+          <pc:sldMk cId="3775666298" sldId="264"/>
+        </pc:sldMkLst>
+        <pc:spChg chg="mod">
+          <ac:chgData name="Mercer, Emmaline" userId="9fb0acdb-0feb-4638-aad2-6b70626d8df4" providerId="ADAL" clId="{52C90AF6-B0D0-BA44-AC3D-6E376D800E03}" dt="2024-10-24T03:00:06.850" v="2208" actId="20577"/>
+          <ac:spMkLst>
+            <pc:docMk/>
+            <pc:sldMk cId="3775666298" sldId="264"/>
+            <ac:spMk id="3" creationId="{65C42759-632A-84C2-6647-6A5B31AD0A9D}"/>
+          </ac:spMkLst>
+        </pc:spChg>
+      </pc:sldChg>
+      <pc:sldChg chg="modSp mod">
+        <pc:chgData name="Mercer, Emmaline" userId="9fb0acdb-0feb-4638-aad2-6b70626d8df4" providerId="ADAL" clId="{52C90AF6-B0D0-BA44-AC3D-6E376D800E03}" dt="2024-10-24T03:00:28.946" v="2212" actId="113"/>
+        <pc:sldMkLst>
+          <pc:docMk/>
+          <pc:sldMk cId="1682318241" sldId="265"/>
+        </pc:sldMkLst>
+        <pc:spChg chg="mod">
+          <ac:chgData name="Mercer, Emmaline" userId="9fb0acdb-0feb-4638-aad2-6b70626d8df4" providerId="ADAL" clId="{52C90AF6-B0D0-BA44-AC3D-6E376D800E03}" dt="2024-10-24T03:00:28.946" v="2212" actId="113"/>
+          <ac:spMkLst>
+            <pc:docMk/>
+            <pc:sldMk cId="1682318241" sldId="265"/>
+            <ac:spMk id="3" creationId="{16EDA5A4-96B4-E7B4-EFE2-FCD21E575D66}"/>
+          </ac:spMkLst>
+        </pc:spChg>
+      </pc:sldChg>
     </pc:docChg>
   </pc:docChgLst>
 </pc:chgInfo>
@@ -336,7 +389,7 @@
           <a:p>
             <a:fld id="{EE9BC6B7-6403-5345-A0C1-EA79D32D7128}" type="datetimeFigureOut">
               <a:rPr lang="en-US" smtClean="0"/>
-              <a:t>10/16/24</a:t>
+              <a:t>10/25/24</a:t>
             </a:fld>
             <a:endParaRPr lang="en-US"/>
           </a:p>
@@ -506,7 +559,7 @@
           <a:p>
             <a:fld id="{EE9BC6B7-6403-5345-A0C1-EA79D32D7128}" type="datetimeFigureOut">
               <a:rPr lang="en-US" smtClean="0"/>
-              <a:t>10/16/24</a:t>
+              <a:t>10/25/24</a:t>
             </a:fld>
             <a:endParaRPr lang="en-US"/>
           </a:p>
@@ -686,7 +739,7 @@
           <a:p>
             <a:fld id="{EE9BC6B7-6403-5345-A0C1-EA79D32D7128}" type="datetimeFigureOut">
               <a:rPr lang="en-US" smtClean="0"/>
-              <a:t>10/16/24</a:t>
+              <a:t>10/25/24</a:t>
             </a:fld>
             <a:endParaRPr lang="en-US"/>
           </a:p>
@@ -856,7 +909,7 @@
           <a:p>
             <a:fld id="{EE9BC6B7-6403-5345-A0C1-EA79D32D7128}" type="datetimeFigureOut">
               <a:rPr lang="en-US" smtClean="0"/>
-              <a:t>10/16/24</a:t>
+              <a:t>10/25/24</a:t>
             </a:fld>
             <a:endParaRPr lang="en-US"/>
           </a:p>
@@ -1102,7 +1155,7 @@
           <a:p>
             <a:fld id="{EE9BC6B7-6403-5345-A0C1-EA79D32D7128}" type="datetimeFigureOut">
               <a:rPr lang="en-US" smtClean="0"/>
-              <a:t>10/16/24</a:t>
+              <a:t>10/25/24</a:t>
             </a:fld>
             <a:endParaRPr lang="en-US"/>
           </a:p>
@@ -1334,7 +1387,7 @@
           <a:p>
             <a:fld id="{EE9BC6B7-6403-5345-A0C1-EA79D32D7128}" type="datetimeFigureOut">
               <a:rPr lang="en-US" smtClean="0"/>
-              <a:t>10/16/24</a:t>
+              <a:t>10/25/24</a:t>
             </a:fld>
             <a:endParaRPr lang="en-US"/>
           </a:p>
@@ -1701,7 +1754,7 @@
           <a:p>
             <a:fld id="{EE9BC6B7-6403-5345-A0C1-EA79D32D7128}" type="datetimeFigureOut">
               <a:rPr lang="en-US" smtClean="0"/>
-              <a:t>10/16/24</a:t>
+              <a:t>10/25/24</a:t>
             </a:fld>
             <a:endParaRPr lang="en-US"/>
           </a:p>
@@ -1819,7 +1872,7 @@
           <a:p>
             <a:fld id="{EE9BC6B7-6403-5345-A0C1-EA79D32D7128}" type="datetimeFigureOut">
               <a:rPr lang="en-US" smtClean="0"/>
-              <a:t>10/16/24</a:t>
+              <a:t>10/25/24</a:t>
             </a:fld>
             <a:endParaRPr lang="en-US"/>
           </a:p>
@@ -1914,7 +1967,7 @@
           <a:p>
             <a:fld id="{EE9BC6B7-6403-5345-A0C1-EA79D32D7128}" type="datetimeFigureOut">
               <a:rPr lang="en-US" smtClean="0"/>
-              <a:t>10/16/24</a:t>
+              <a:t>10/25/24</a:t>
             </a:fld>
             <a:endParaRPr lang="en-US"/>
           </a:p>
@@ -2191,7 +2244,7 @@
           <a:p>
             <a:fld id="{EE9BC6B7-6403-5345-A0C1-EA79D32D7128}" type="datetimeFigureOut">
               <a:rPr lang="en-US" smtClean="0"/>
-              <a:t>10/16/24</a:t>
+              <a:t>10/25/24</a:t>
             </a:fld>
             <a:endParaRPr lang="en-US"/>
           </a:p>
@@ -2448,7 +2501,7 @@
           <a:p>
             <a:fld id="{EE9BC6B7-6403-5345-A0C1-EA79D32D7128}" type="datetimeFigureOut">
               <a:rPr lang="en-US" smtClean="0"/>
-              <a:t>10/16/24</a:t>
+              <a:t>10/25/24</a:t>
             </a:fld>
             <a:endParaRPr lang="en-US"/>
           </a:p>
@@ -2661,7 +2714,7 @@
           <a:p>
             <a:fld id="{EE9BC6B7-6403-5345-A0C1-EA79D32D7128}" type="datetimeFigureOut">
               <a:rPr lang="en-US" smtClean="0"/>
-              <a:t>10/16/24</a:t>
+              <a:t>10/25/24</a:t>
             </a:fld>
             <a:endParaRPr lang="en-US"/>
           </a:p>
@@ -3132,19 +3185,16 @@
               <a:rPr lang="en-US" dirty="0">
                 <a:hlinkClick r:id="rId2"/>
               </a:rPr>
-              <a:t>https://eewmercer.github.io/flashcard_system/</a:t>
-            </a:r>
-            <a:r>
-              <a:rPr lang="en-US" dirty="0"/>
-              <a:t> </a:t>
-            </a:r>
+              <a:t>https://github.com/eewmercer/CS311_Project2</a:t>
+            </a:r>
+            <a:endParaRPr lang="en-US" dirty="0"/>
           </a:p>
           <a:p>
             <a:r>
               <a:rPr lang="en-US" dirty="0">
                 <a:hlinkClick r:id="rId3"/>
               </a:rPr>
-              <a:t>https://github.com/eewmercer/flashcard_system/tree/main/flashcards</a:t>
+              <a:t>https://cs-311-project2-irgw5l4k7-emmalines-projects.vercel.app/cards</a:t>
             </a:r>
             <a:r>
               <a:rPr lang="en-US" dirty="0"/>
@@ -4151,7 +4201,9 @@
         </p:nvSpPr>
         <p:spPr/>
         <p:txBody>
-          <a:bodyPr/>
+          <a:bodyPr>
+            <a:normAutofit fontScale="92500" lnSpcReduction="20000"/>
+          </a:bodyPr>
           <a:lstStyle/>
           <a:p>
             <a:r>
@@ -4166,15 +4218,36 @@
             </a:r>
           </a:p>
           <a:p>
+            <a:pPr lvl="1"/>
+            <a:r>
+              <a:rPr lang="en-US" dirty="0"/>
+              <a:t>It has been difficult to code an algorithm to sort the cards, and I’m struggling with programming a way to ask the user how they would like the relevance measured. </a:t>
+            </a:r>
+          </a:p>
+          <a:p>
             <a:r>
               <a:rPr lang="en-US" dirty="0"/>
               <a:t>User testing struggles – how to structure, what questions to ask</a:t>
             </a:r>
           </a:p>
           <a:p>
+            <a:pPr lvl="1"/>
+            <a:r>
+              <a:rPr lang="en-US" dirty="0"/>
+              <a:t>Some user testing issues included the timing algorithm to measure the user’s understanding for each card. The structure of the card layout with a “know” and “don’t know” box was helpful.</a:t>
+            </a:r>
+          </a:p>
+          <a:p>
             <a:r>
               <a:rPr lang="en-US" dirty="0"/>
               <a:t>Routing and layout concerns</a:t>
+            </a:r>
+          </a:p>
+          <a:p>
+            <a:pPr lvl="1"/>
+            <a:r>
+              <a:rPr lang="en-US" dirty="0"/>
+              <a:t>No routing and layout concerns, the routes were fairly easy to navigate based on the way they were implemented.</a:t>
             </a:r>
           </a:p>
           <a:p>
@@ -4273,7 +4346,11 @@
             </a:r>
           </a:p>
           <a:p>
-            <a:endParaRPr lang="en-US" dirty="0"/>
+            <a:pPr lvl="1"/>
+            <a:r>
+              <a:rPr lang="en-US" dirty="0"/>
+              <a:t>My main struggle as of now has been setting up the timing algorithm for the cards. It’s been difficult to determine the math behind it while also getting the current time. The routing makes sense as of now, and I haven’t had too many issues with that. The main thing I need to focus on is the timing algorithm.</a:t>
+            </a:r>
           </a:p>
         </p:txBody>
       </p:sp>
@@ -4367,25 +4444,49 @@
           <a:p>
             <a:r>
               <a:rPr lang="en-US" dirty="0"/>
-              <a:t>Page layout standards:	low	medium	excellent</a:t>
-            </a:r>
-          </a:p>
-          <a:p>
-            <a:r>
-              <a:rPr lang="en-US" dirty="0"/>
-              <a:t>Routing application:		 low	medium	excellent</a:t>
-            </a:r>
-          </a:p>
-          <a:p>
-            <a:r>
-              <a:rPr lang="en-US" dirty="0"/>
-              <a:t>Code cleanliness:		 low	medium	excellent</a:t>
-            </a:r>
-          </a:p>
-          <a:p>
-            <a:r>
-              <a:rPr lang="en-US" dirty="0"/>
-              <a:t>Data accessibility: 		low	medium	excellent</a:t>
+              <a:t>Page layout standards:	low	medium	</a:t>
+            </a:r>
+            <a:r>
+              <a:rPr lang="en-US" b="1" dirty="0"/>
+              <a:t>excellent</a:t>
+            </a:r>
+          </a:p>
+          <a:p>
+            <a:r>
+              <a:rPr lang="en-US" dirty="0"/>
+              <a:t>Routing application:		 low	medium	</a:t>
+            </a:r>
+            <a:r>
+              <a:rPr lang="en-US" b="1" dirty="0"/>
+              <a:t>excellent</a:t>
+            </a:r>
+          </a:p>
+          <a:p>
+            <a:r>
+              <a:rPr lang="en-US" dirty="0"/>
+              <a:t>Code cleanliness:		 low	</a:t>
+            </a:r>
+            <a:r>
+              <a:rPr lang="en-US" b="1" dirty="0"/>
+              <a:t>medium</a:t>
+            </a:r>
+            <a:r>
+              <a:rPr lang="en-US" dirty="0"/>
+              <a:t>	excellent</a:t>
+            </a:r>
+          </a:p>
+          <a:p>
+            <a:r>
+              <a:rPr lang="en-US" dirty="0"/>
+              <a:t>Data accessibility: 		</a:t>
+            </a:r>
+            <a:r>
+              <a:rPr lang="en-US" b="1" dirty="0"/>
+              <a:t>low</a:t>
+            </a:r>
+            <a:r>
+              <a:rPr lang="en-US" dirty="0"/>
+              <a:t>	medium	excellent</a:t>
             </a:r>
           </a:p>
           <a:p>

</xml_diff>